<commit_message>
editing report file and presentation; adding oil plot to main code
</commit_message>
<xml_diff>
--- a/Project 1 presentation.pptx
+++ b/Project 1 presentation.pptx
@@ -5,7 +5,7 @@
     <p:sldMasterId id="2147483746" r:id="rId1"/>
   </p:sldMasterIdLst>
   <p:notesMasterIdLst>
-    <p:notesMasterId r:id="rId15"/>
+    <p:notesMasterId r:id="rId16"/>
   </p:notesMasterIdLst>
   <p:sldIdLst>
     <p:sldId id="263" r:id="rId2"/>
@@ -20,7 +20,8 @@
     <p:sldId id="271" r:id="rId11"/>
     <p:sldId id="272" r:id="rId12"/>
     <p:sldId id="273" r:id="rId13"/>
-    <p:sldId id="274" r:id="rId14"/>
+    <p:sldId id="275" r:id="rId14"/>
+    <p:sldId id="274" r:id="rId15"/>
   </p:sldIdLst>
   <p:sldSz cx="12192000" cy="6858000"/>
   <p:notesSz cx="6858000" cy="9144000"/>
@@ -4519,6 +4520,106 @@
 <file path=ppt/slides/slide13.xml><?xml version="1.0" encoding="utf-8"?>
 <p:sld xmlns:a="http://schemas.openxmlformats.org/drawingml/2006/main" xmlns:r="http://schemas.openxmlformats.org/officeDocument/2006/relationships" xmlns:p="http://schemas.openxmlformats.org/presentationml/2006/main">
   <p:cSld>
+    <p:spTree>
+      <p:nvGrpSpPr>
+        <p:cNvPr id="1" name=""/>
+        <p:cNvGrpSpPr/>
+        <p:nvPr/>
+      </p:nvGrpSpPr>
+      <p:grpSpPr>
+        <a:xfrm>
+          <a:off x="0" y="0"/>
+          <a:ext cx="0" cy="0"/>
+          <a:chOff x="0" y="0"/>
+          <a:chExt cx="0" cy="0"/>
+        </a:xfrm>
+      </p:grpSpPr>
+      <p:pic>
+        <p:nvPicPr>
+          <p:cNvPr id="3" name="Picture 2" descr="A close up of a map&#10;&#10;Description automatically generated">
+            <a:extLst>
+              <a:ext uri="{FF2B5EF4-FFF2-40B4-BE49-F238E27FC236}">
+                <a16:creationId xmlns:a16="http://schemas.microsoft.com/office/drawing/2014/main" id="{3107155D-C15D-44CA-BE00-9B442B395E73}"/>
+              </a:ext>
+            </a:extLst>
+          </p:cNvPr>
+          <p:cNvPicPr>
+            <a:picLocks noChangeAspect="1"/>
+          </p:cNvPicPr>
+          <p:nvPr/>
+        </p:nvPicPr>
+        <p:blipFill rotWithShape="1">
+          <a:blip r:embed="rId2">
+            <a:extLst>
+              <a:ext uri="{28A0092B-C50C-407E-A947-70E740481C1C}">
+                <a14:useLocalDpi xmlns:a14="http://schemas.microsoft.com/office/drawing/2010/main" val="0"/>
+              </a:ext>
+            </a:extLst>
+          </a:blip>
+          <a:srcRect l="5755" t="8240" r="7504" b="6966"/>
+          <a:stretch/>
+        </p:blipFill>
+        <p:spPr>
+          <a:xfrm>
+            <a:off x="318796" y="267798"/>
+            <a:ext cx="5948737" cy="5815174"/>
+          </a:xfrm>
+          <a:prstGeom prst="rect">
+            <a:avLst/>
+          </a:prstGeom>
+        </p:spPr>
+      </p:pic>
+      <p:pic>
+        <p:nvPicPr>
+          <p:cNvPr id="6" name="Picture 5" descr="A close up of text on a white background&#10;&#10;Description automatically generated">
+            <a:extLst>
+              <a:ext uri="{FF2B5EF4-FFF2-40B4-BE49-F238E27FC236}">
+                <a16:creationId xmlns:a16="http://schemas.microsoft.com/office/drawing/2014/main" id="{4BF0FE0C-27B6-400A-802C-04F42A4DBCF0}"/>
+              </a:ext>
+            </a:extLst>
+          </p:cNvPr>
+          <p:cNvPicPr>
+            <a:picLocks noChangeAspect="1"/>
+          </p:cNvPicPr>
+          <p:nvPr/>
+        </p:nvPicPr>
+        <p:blipFill rotWithShape="1">
+          <a:blip r:embed="rId3">
+            <a:extLst>
+              <a:ext uri="{28A0092B-C50C-407E-A947-70E740481C1C}">
+                <a14:useLocalDpi xmlns:a14="http://schemas.microsoft.com/office/drawing/2010/main" val="0"/>
+              </a:ext>
+            </a:extLst>
+          </a:blip>
+          <a:srcRect l="4993" r="9022"/>
+          <a:stretch/>
+        </p:blipFill>
+        <p:spPr>
+          <a:xfrm>
+            <a:off x="6267533" y="1131689"/>
+            <a:ext cx="5724940" cy="4161252"/>
+          </a:xfrm>
+          <a:prstGeom prst="rect">
+            <a:avLst/>
+          </a:prstGeom>
+        </p:spPr>
+      </p:pic>
+    </p:spTree>
+    <p:extLst>
+      <p:ext uri="{BB962C8B-B14F-4D97-AF65-F5344CB8AC3E}">
+        <p14:creationId xmlns:p14="http://schemas.microsoft.com/office/powerpoint/2010/main" val="3668135944"/>
+      </p:ext>
+    </p:extLst>
+  </p:cSld>
+  <p:clrMapOvr>
+    <a:masterClrMapping/>
+  </p:clrMapOvr>
+</p:sld>
+</file>
+
+<file path=ppt/slides/slide14.xml><?xml version="1.0" encoding="utf-8"?>
+<p:sld xmlns:a="http://schemas.openxmlformats.org/drawingml/2006/main" xmlns:r="http://schemas.openxmlformats.org/officeDocument/2006/relationships" xmlns:p="http://schemas.openxmlformats.org/presentationml/2006/main">
+  <p:cSld>
     <p:bg>
       <p:bgPr>
         <a:solidFill>
@@ -4709,15 +4810,7 @@
                   <a:schemeClr val="tx1"/>
                 </a:solidFill>
               </a:rPr>
-              <a:t>Observe how number of Tech companies in the city effects population, employment and salaries in the </a:t>
-            </a:r>
-            <a:r>
-              <a:rPr lang="en-CA" sz="2800" i="1" dirty="0" err="1">
-                <a:solidFill>
-                  <a:schemeClr val="tx1"/>
-                </a:solidFill>
-              </a:rPr>
-              <a:t>citiy</a:t>
+              <a:t>Observe how number of Tech companies in the city effects population, employment and salaries in the city</a:t>
             </a:r>
             <a:endParaRPr lang="en-US" sz="2400" dirty="0">
               <a:solidFill>

</xml_diff>